<commit_message>
+ add turing automaton & language-05, edit language-05 diagram
</commit_message>
<xml_diff>
--- a/Diagrams/Diagrams.pptx
+++ b/Diagrams/Diagrams.pptx
@@ -10411,7 +10411,7 @@
                   <a:schemeClr val="tx1"/>
                 </a:solidFill>
               </a:rPr>
-              <a:t>Q5</a:t>
+              <a:t>Q7</a:t>
             </a:r>
           </a:p>
         </p:txBody>
@@ -10470,7 +10470,7 @@
                   <a:schemeClr val="tx1"/>
                 </a:solidFill>
               </a:rPr>
-              <a:t>Q5</a:t>
+              <a:t>Q9</a:t>
             </a:r>
           </a:p>
         </p:txBody>
@@ -10529,7 +10529,7 @@
                   <a:schemeClr val="tx1"/>
                 </a:solidFill>
               </a:rPr>
-              <a:t>Q5</a:t>
+              <a:t>Q6</a:t>
             </a:r>
           </a:p>
         </p:txBody>
@@ -10588,7 +10588,7 @@
                   <a:schemeClr val="tx1"/>
                 </a:solidFill>
               </a:rPr>
-              <a:t>Q5</a:t>
+              <a:t>Q8</a:t>
             </a:r>
           </a:p>
         </p:txBody>

</xml_diff>